<commit_message>
update introduction to conda slides
</commit_message>
<xml_diff>
--- a/artic-ont-viral/tutorials-and-materials/intro-to-conda.pptx
+++ b/artic-ont-viral/tutorials-and-materials/intro-to-conda.pptx
@@ -214,7 +214,7 @@
           <a:p>
             <a:fld id="{81F79FCF-2BA4-3C40-987B-A8D1C1E50586}" type="datetimeFigureOut">
               <a:rPr lang="en-KE" smtClean="0"/>
-              <a:t>14/02/2023</a:t>
+              <a:t>09/03/2023</a:t>
             </a:fld>
             <a:endParaRPr lang="en-KE"/>
           </a:p>
@@ -2484,7 +2484,7 @@
           <a:p>
             <a:fld id="{2F98F39E-BC50-A94F-ACE7-DBF269962428}" type="datetimeFigureOut">
               <a:rPr lang="en-KE" smtClean="0"/>
-              <a:t>14/02/2023</a:t>
+              <a:t>09/03/2023</a:t>
             </a:fld>
             <a:endParaRPr lang="en-KE"/>
           </a:p>
@@ -2684,7 +2684,7 @@
           <a:p>
             <a:fld id="{2F98F39E-BC50-A94F-ACE7-DBF269962428}" type="datetimeFigureOut">
               <a:rPr lang="en-KE" smtClean="0"/>
-              <a:t>14/02/2023</a:t>
+              <a:t>09/03/2023</a:t>
             </a:fld>
             <a:endParaRPr lang="en-KE"/>
           </a:p>
@@ -2894,7 +2894,7 @@
           <a:p>
             <a:fld id="{2F98F39E-BC50-A94F-ACE7-DBF269962428}" type="datetimeFigureOut">
               <a:rPr lang="en-KE" smtClean="0"/>
-              <a:t>14/02/2023</a:t>
+              <a:t>09/03/2023</a:t>
             </a:fld>
             <a:endParaRPr lang="en-KE"/>
           </a:p>
@@ -4517,7 +4517,7 @@
           <a:p>
             <a:fld id="{2F98F39E-BC50-A94F-ACE7-DBF269962428}" type="datetimeFigureOut">
               <a:rPr lang="en-KE" smtClean="0"/>
-              <a:t>14/02/2023</a:t>
+              <a:t>09/03/2023</a:t>
             </a:fld>
             <a:endParaRPr lang="en-KE"/>
           </a:p>
@@ -4793,7 +4793,7 @@
           <a:p>
             <a:fld id="{2F98F39E-BC50-A94F-ACE7-DBF269962428}" type="datetimeFigureOut">
               <a:rPr lang="en-KE" smtClean="0"/>
-              <a:t>14/02/2023</a:t>
+              <a:t>09/03/2023</a:t>
             </a:fld>
             <a:endParaRPr lang="en-KE"/>
           </a:p>
@@ -5061,7 +5061,7 @@
           <a:p>
             <a:fld id="{2F98F39E-BC50-A94F-ACE7-DBF269962428}" type="datetimeFigureOut">
               <a:rPr lang="en-KE" smtClean="0"/>
-              <a:t>14/02/2023</a:t>
+              <a:t>09/03/2023</a:t>
             </a:fld>
             <a:endParaRPr lang="en-KE"/>
           </a:p>
@@ -5476,7 +5476,7 @@
           <a:p>
             <a:fld id="{2F98F39E-BC50-A94F-ACE7-DBF269962428}" type="datetimeFigureOut">
               <a:rPr lang="en-KE" smtClean="0"/>
-              <a:t>14/02/2023</a:t>
+              <a:t>09/03/2023</a:t>
             </a:fld>
             <a:endParaRPr lang="en-KE"/>
           </a:p>
@@ -5618,7 +5618,7 @@
           <a:p>
             <a:fld id="{2F98F39E-BC50-A94F-ACE7-DBF269962428}" type="datetimeFigureOut">
               <a:rPr lang="en-KE" smtClean="0"/>
-              <a:t>14/02/2023</a:t>
+              <a:t>09/03/2023</a:t>
             </a:fld>
             <a:endParaRPr lang="en-KE"/>
           </a:p>
@@ -5731,7 +5731,7 @@
           <a:p>
             <a:fld id="{2F98F39E-BC50-A94F-ACE7-DBF269962428}" type="datetimeFigureOut">
               <a:rPr lang="en-KE" smtClean="0"/>
-              <a:t>14/02/2023</a:t>
+              <a:t>09/03/2023</a:t>
             </a:fld>
             <a:endParaRPr lang="en-KE"/>
           </a:p>
@@ -6044,7 +6044,7 @@
           <a:p>
             <a:fld id="{2F98F39E-BC50-A94F-ACE7-DBF269962428}" type="datetimeFigureOut">
               <a:rPr lang="en-KE" smtClean="0"/>
-              <a:t>14/02/2023</a:t>
+              <a:t>09/03/2023</a:t>
             </a:fld>
             <a:endParaRPr lang="en-KE"/>
           </a:p>
@@ -6333,7 +6333,7 @@
           <a:p>
             <a:fld id="{2F98F39E-BC50-A94F-ACE7-DBF269962428}" type="datetimeFigureOut">
               <a:rPr lang="en-KE" smtClean="0"/>
-              <a:t>14/02/2023</a:t>
+              <a:t>09/03/2023</a:t>
             </a:fld>
             <a:endParaRPr lang="en-KE"/>
           </a:p>
@@ -6576,7 +6576,7 @@
           <a:p>
             <a:fld id="{2F98F39E-BC50-A94F-ACE7-DBF269962428}" type="datetimeFigureOut">
               <a:rPr lang="en-KE" smtClean="0"/>
-              <a:t>14/02/2023</a:t>
+              <a:t>09/03/2023</a:t>
             </a:fld>
             <a:endParaRPr lang="en-KE"/>
           </a:p>
@@ -10507,7 +10507,7 @@
                 <a:cs typeface="Calibri"/>
                 <a:sym typeface="Calibri"/>
               </a:rPr>
-              <a:t>Operators</a:t>
+              <a:t>Exercises</a:t>
             </a:r>
             <a:endParaRPr lang="en-US" dirty="0">
               <a:latin typeface="Century Gothic" panose="020B0502020202020204" pitchFamily="34" charset="0"/>
@@ -10548,711 +10548,6 @@
           </a:ln>
         </p:spPr>
       </p:pic>
-      <p:graphicFrame>
-        <p:nvGraphicFramePr>
-          <p:cNvPr id="2" name="Table 2">
-            <a:extLst>
-              <a:ext uri="{FF2B5EF4-FFF2-40B4-BE49-F238E27FC236}">
-                <a16:creationId xmlns:a16="http://schemas.microsoft.com/office/drawing/2014/main" id="{E941AE4E-78F8-26A4-420F-2A70C79F3F23}"/>
-              </a:ext>
-            </a:extLst>
-          </p:cNvPr>
-          <p:cNvGraphicFramePr>
-            <a:graphicFrameLocks noGrp="1"/>
-          </p:cNvGraphicFramePr>
-          <p:nvPr>
-            <p:extLst>
-              <p:ext uri="{D42A27DB-BD31-4B8C-83A1-F6EECF244321}">
-                <p14:modId xmlns:p14="http://schemas.microsoft.com/office/powerpoint/2010/main" val="3741512850"/>
-              </p:ext>
-            </p:extLst>
-          </p:nvPr>
-        </p:nvGraphicFramePr>
-        <p:xfrm>
-          <a:off x="671525" y="1142838"/>
-          <a:ext cx="9023420" cy="5450988"/>
-        </p:xfrm>
-        <a:graphic>
-          <a:graphicData uri="http://schemas.openxmlformats.org/drawingml/2006/table">
-            <a:tbl>
-              <a:tblPr firstRow="1" bandRow="1">
-                <a:tableStyleId>{F5AB1C69-6EDB-4FF4-983F-18BD219EF322}</a:tableStyleId>
-              </a:tblPr>
-              <a:tblGrid>
-                <a:gridCol w="4241731">
-                  <a:extLst>
-                    <a:ext uri="{9D8B030D-6E8A-4147-A177-3AD203B41FA5}">
-                      <a16:colId xmlns:a16="http://schemas.microsoft.com/office/drawing/2014/main" val="2807705131"/>
-                    </a:ext>
-                  </a:extLst>
-                </a:gridCol>
-                <a:gridCol w="4781689">
-                  <a:extLst>
-                    <a:ext uri="{9D8B030D-6E8A-4147-A177-3AD203B41FA5}">
-                      <a16:colId xmlns:a16="http://schemas.microsoft.com/office/drawing/2014/main" val="977531356"/>
-                    </a:ext>
-                  </a:extLst>
-                </a:gridCol>
-              </a:tblGrid>
-              <a:tr h="286986">
-                <a:tc>
-                  <a:txBody>
-                    <a:bodyPr/>
-                    <a:lstStyle/>
-                    <a:p>
-                      <a:r>
-                        <a:rPr lang="en-KE" sz="1400" dirty="0"/>
-                        <a:t>Option</a:t>
-                      </a:r>
-                    </a:p>
-                  </a:txBody>
-                  <a:tcPr/>
-                </a:tc>
-                <a:tc>
-                  <a:txBody>
-                    <a:bodyPr/>
-                    <a:lstStyle/>
-                    <a:p>
-                      <a:r>
-                        <a:rPr lang="en-KE" sz="1400" dirty="0"/>
-                        <a:t>Operator</a:t>
-                      </a:r>
-                    </a:p>
-                  </a:txBody>
-                  <a:tcPr/>
-                </a:tc>
-                <a:extLst>
-                  <a:ext uri="{0D108BD9-81ED-4DB2-BD59-A6C34878D82A}">
-                    <a16:rowId xmlns:a16="http://schemas.microsoft.com/office/drawing/2014/main" val="3402527966"/>
-                  </a:ext>
-                </a:extLst>
-              </a:tr>
-              <a:tr h="286986">
-                <a:tc>
-                  <a:txBody>
-                    <a:bodyPr/>
-                    <a:lstStyle/>
-                    <a:p>
-                      <a:r>
-                        <a:rPr lang="en-KE" sz="1400" dirty="0"/>
-                        <a:t>-eq</a:t>
-                      </a:r>
-                    </a:p>
-                  </a:txBody>
-                  <a:tcPr/>
-                </a:tc>
-                <a:tc>
-                  <a:txBody>
-                    <a:bodyPr/>
-                    <a:lstStyle/>
-                    <a:p>
-                      <a:r>
-                        <a:rPr lang="en-US" sz="1400" dirty="0"/>
-                        <a:t>I</a:t>
-                      </a:r>
-                      <a:r>
-                        <a:rPr lang="en-KE" sz="1400" dirty="0"/>
-                        <a:t>s equal to e.g., 5 == 6; if test 5 –eq 6; if [ 5 –eq 6]</a:t>
-                      </a:r>
-                    </a:p>
-                  </a:txBody>
-                  <a:tcPr/>
-                </a:tc>
-                <a:extLst>
-                  <a:ext uri="{0D108BD9-81ED-4DB2-BD59-A6C34878D82A}">
-                    <a16:rowId xmlns:a16="http://schemas.microsoft.com/office/drawing/2014/main" val="2630215785"/>
-                  </a:ext>
-                </a:extLst>
-              </a:tr>
-              <a:tr h="286986">
-                <a:tc>
-                  <a:txBody>
-                    <a:bodyPr/>
-                    <a:lstStyle/>
-                    <a:p>
-                      <a:r>
-                        <a:rPr lang="en-KE" sz="1400" dirty="0"/>
-                        <a:t>-ne</a:t>
-                      </a:r>
-                    </a:p>
-                  </a:txBody>
-                  <a:tcPr/>
-                </a:tc>
-                <a:tc>
-                  <a:txBody>
-                    <a:bodyPr/>
-                    <a:lstStyle/>
-                    <a:p>
-                      <a:r>
-                        <a:rPr lang="en-US" sz="1400" dirty="0"/>
-                        <a:t>I</a:t>
-                      </a:r>
-                      <a:r>
-                        <a:rPr lang="en-KE" sz="1400" dirty="0"/>
-                        <a:t>s not equal e.g., 5 != 6; if test 5 –ne 6; if [ 5 –ne 6]</a:t>
-                      </a:r>
-                    </a:p>
-                  </a:txBody>
-                  <a:tcPr/>
-                </a:tc>
-                <a:extLst>
-                  <a:ext uri="{0D108BD9-81ED-4DB2-BD59-A6C34878D82A}">
-                    <a16:rowId xmlns:a16="http://schemas.microsoft.com/office/drawing/2014/main" val="1129842302"/>
-                  </a:ext>
-                </a:extLst>
-              </a:tr>
-              <a:tr h="286986">
-                <a:tc>
-                  <a:txBody>
-                    <a:bodyPr/>
-                    <a:lstStyle/>
-                    <a:p>
-                      <a:r>
-                        <a:rPr lang="en-KE" sz="1400" dirty="0"/>
-                        <a:t>-lt</a:t>
-                      </a:r>
-                    </a:p>
-                  </a:txBody>
-                  <a:tcPr/>
-                </a:tc>
-                <a:tc>
-                  <a:txBody>
-                    <a:bodyPr/>
-                    <a:lstStyle/>
-                    <a:p>
-                      <a:r>
-                        <a:rPr lang="en-US" sz="1400" dirty="0"/>
-                        <a:t>I</a:t>
-                      </a:r>
-                      <a:r>
-                        <a:rPr lang="en-KE" sz="1400" dirty="0"/>
-                        <a:t>s less than e.g., 5 &lt; 6; if test 5 –lt 6; if [ 5 –lt 6 ]</a:t>
-                      </a:r>
-                    </a:p>
-                  </a:txBody>
-                  <a:tcPr/>
-                </a:tc>
-                <a:extLst>
-                  <a:ext uri="{0D108BD9-81ED-4DB2-BD59-A6C34878D82A}">
-                    <a16:rowId xmlns:a16="http://schemas.microsoft.com/office/drawing/2014/main" val="2592750098"/>
-                  </a:ext>
-                </a:extLst>
-              </a:tr>
-              <a:tr h="439494">
-                <a:tc>
-                  <a:txBody>
-                    <a:bodyPr/>
-                    <a:lstStyle/>
-                    <a:p>
-                      <a:r>
-                        <a:rPr lang="en-KE" sz="1400" dirty="0"/>
-                        <a:t>-le</a:t>
-                      </a:r>
-                    </a:p>
-                  </a:txBody>
-                  <a:tcPr/>
-                </a:tc>
-                <a:tc>
-                  <a:txBody>
-                    <a:bodyPr/>
-                    <a:lstStyle/>
-                    <a:p>
-                      <a:r>
-                        <a:rPr lang="en-US" sz="1400" dirty="0"/>
-                        <a:t>I</a:t>
-                      </a:r>
-                      <a:r>
-                        <a:rPr lang="en-KE" sz="1400" dirty="0"/>
-                        <a:t>s less than or equal to e.g., 5 &lt;= 6; if test 5 –le 6; if [ 5 –le 6 ]</a:t>
-                      </a:r>
-                    </a:p>
-                  </a:txBody>
-                  <a:tcPr/>
-                </a:tc>
-                <a:extLst>
-                  <a:ext uri="{0D108BD9-81ED-4DB2-BD59-A6C34878D82A}">
-                    <a16:rowId xmlns:a16="http://schemas.microsoft.com/office/drawing/2014/main" val="4053943877"/>
-                  </a:ext>
-                </a:extLst>
-              </a:tr>
-              <a:tr h="439494">
-                <a:tc>
-                  <a:txBody>
-                    <a:bodyPr/>
-                    <a:lstStyle/>
-                    <a:p>
-                      <a:r>
-                        <a:rPr lang="en-KE" sz="1400" dirty="0"/>
-                        <a:t>-ge</a:t>
-                      </a:r>
-                    </a:p>
-                  </a:txBody>
-                  <a:tcPr/>
-                </a:tc>
-                <a:tc>
-                  <a:txBody>
-                    <a:bodyPr/>
-                    <a:lstStyle/>
-                    <a:p>
-                      <a:r>
-                        <a:rPr lang="en-US" sz="1400" dirty="0"/>
-                        <a:t>I</a:t>
-                      </a:r>
-                      <a:r>
-                        <a:rPr lang="en-KE" sz="1400" dirty="0"/>
-                        <a:t>s greater than or equal to 5 &gt;= 6; if test 5 –ge 6; if [ 5 –ge 6 ]</a:t>
-                      </a:r>
-                    </a:p>
-                  </a:txBody>
-                  <a:tcPr/>
-                </a:tc>
-                <a:extLst>
-                  <a:ext uri="{0D108BD9-81ED-4DB2-BD59-A6C34878D82A}">
-                    <a16:rowId xmlns:a16="http://schemas.microsoft.com/office/drawing/2014/main" val="3096984057"/>
-                  </a:ext>
-                </a:extLst>
-              </a:tr>
-              <a:tr h="286986">
-                <a:tc>
-                  <a:txBody>
-                    <a:bodyPr/>
-                    <a:lstStyle/>
-                    <a:p>
-                      <a:r>
-                        <a:rPr lang="en-US" sz="1400" dirty="0"/>
-                        <a:t>s</a:t>
-                      </a:r>
-                      <a:r>
-                        <a:rPr lang="en-KE" sz="1400" dirty="0"/>
-                        <a:t>tring1 == string2</a:t>
-                      </a:r>
-                    </a:p>
-                  </a:txBody>
-                  <a:tcPr/>
-                </a:tc>
-                <a:tc>
-                  <a:txBody>
-                    <a:bodyPr/>
-                    <a:lstStyle/>
-                    <a:p>
-                      <a:r>
-                        <a:rPr lang="en-US" sz="1400" dirty="0"/>
-                        <a:t>s</a:t>
-                      </a:r>
-                      <a:r>
-                        <a:rPr lang="en-KE" sz="1400" dirty="0"/>
-                        <a:t>tring1 is equal to string2</a:t>
-                      </a:r>
-                    </a:p>
-                  </a:txBody>
-                  <a:tcPr/>
-                </a:tc>
-                <a:extLst>
-                  <a:ext uri="{0D108BD9-81ED-4DB2-BD59-A6C34878D82A}">
-                    <a16:rowId xmlns:a16="http://schemas.microsoft.com/office/drawing/2014/main" val="335086863"/>
-                  </a:ext>
-                </a:extLst>
-              </a:tr>
-              <a:tr h="286986">
-                <a:tc>
-                  <a:txBody>
-                    <a:bodyPr/>
-                    <a:lstStyle/>
-                    <a:p>
-                      <a:r>
-                        <a:rPr lang="en-US" sz="1400" dirty="0"/>
-                        <a:t>s</a:t>
-                      </a:r>
-                      <a:r>
-                        <a:rPr lang="en-KE" sz="1400" dirty="0"/>
-                        <a:t>tring1 != string2</a:t>
-                      </a:r>
-                    </a:p>
-                  </a:txBody>
-                  <a:tcPr/>
-                </a:tc>
-                <a:tc>
-                  <a:txBody>
-                    <a:bodyPr/>
-                    <a:lstStyle/>
-                    <a:p>
-                      <a:r>
-                        <a:rPr lang="en-US" sz="1400" dirty="0"/>
-                        <a:t>s</a:t>
-                      </a:r>
-                      <a:r>
-                        <a:rPr lang="en-KE" sz="1400" dirty="0"/>
-                        <a:t>tring1 is not equal to string2</a:t>
-                      </a:r>
-                    </a:p>
-                  </a:txBody>
-                  <a:tcPr/>
-                </a:tc>
-                <a:extLst>
-                  <a:ext uri="{0D108BD9-81ED-4DB2-BD59-A6C34878D82A}">
-                    <a16:rowId xmlns:a16="http://schemas.microsoft.com/office/drawing/2014/main" val="899670178"/>
-                  </a:ext>
-                </a:extLst>
-              </a:tr>
-              <a:tr h="286986">
-                <a:tc>
-                  <a:txBody>
-                    <a:bodyPr/>
-                    <a:lstStyle/>
-                    <a:p>
-                      <a:r>
-                        <a:rPr lang="en-KE" sz="1400" dirty="0"/>
-                        <a:t>-s file</a:t>
-                      </a:r>
-                    </a:p>
-                  </a:txBody>
-                  <a:tcPr/>
-                </a:tc>
-                <a:tc>
-                  <a:txBody>
-                    <a:bodyPr/>
-                    <a:lstStyle/>
-                    <a:p>
-                      <a:r>
-                        <a:rPr lang="en-KE" sz="1400" dirty="0"/>
-                        <a:t>Non-empty file</a:t>
-                      </a:r>
-                    </a:p>
-                  </a:txBody>
-                  <a:tcPr/>
-                </a:tc>
-                <a:extLst>
-                  <a:ext uri="{0D108BD9-81ED-4DB2-BD59-A6C34878D82A}">
-                    <a16:rowId xmlns:a16="http://schemas.microsoft.com/office/drawing/2014/main" val="502897342"/>
-                  </a:ext>
-                </a:extLst>
-              </a:tr>
-              <a:tr h="286986">
-                <a:tc>
-                  <a:txBody>
-                    <a:bodyPr/>
-                    <a:lstStyle/>
-                    <a:p>
-                      <a:pPr marL="0" marR="0" lvl="0" indent="0" algn="l" defTabSz="914400" rtl="0" eaLnBrk="1" fontAlgn="auto" latinLnBrk="0" hangingPunct="1">
-                        <a:lnSpc>
-                          <a:spcPct val="100000"/>
-                        </a:lnSpc>
-                        <a:spcBef>
-                          <a:spcPts val="0"/>
-                        </a:spcBef>
-                        <a:spcAft>
-                          <a:spcPts val="0"/>
-                        </a:spcAft>
-                        <a:buClrTx/>
-                        <a:buSzTx/>
-                        <a:buFontTx/>
-                        <a:buNone/>
-                        <a:tabLst/>
-                        <a:defRPr/>
-                      </a:pPr>
-                      <a:r>
-                        <a:rPr lang="en-KE" sz="1400" dirty="0"/>
-                        <a:t>-f file</a:t>
-                      </a:r>
-                    </a:p>
-                  </a:txBody>
-                  <a:tcPr/>
-                </a:tc>
-                <a:tc>
-                  <a:txBody>
-                    <a:bodyPr/>
-                    <a:lstStyle/>
-                    <a:p>
-                      <a:pPr marL="0" marR="0" lvl="0" indent="0" algn="l" defTabSz="914400" rtl="0" eaLnBrk="1" fontAlgn="auto" latinLnBrk="0" hangingPunct="1">
-                        <a:lnSpc>
-                          <a:spcPct val="100000"/>
-                        </a:lnSpc>
-                        <a:spcBef>
-                          <a:spcPts val="0"/>
-                        </a:spcBef>
-                        <a:spcAft>
-                          <a:spcPts val="0"/>
-                        </a:spcAft>
-                        <a:buClrTx/>
-                        <a:buSzTx/>
-                        <a:buFontTx/>
-                        <a:buNone/>
-                        <a:tabLst/>
-                        <a:defRPr/>
-                      </a:pPr>
-                      <a:r>
-                        <a:rPr lang="en-KE" sz="1400" dirty="0"/>
-                        <a:t>Is file exists or normal file and not a directory</a:t>
-                      </a:r>
-                    </a:p>
-                  </a:txBody>
-                  <a:tcPr/>
-                </a:tc>
-                <a:extLst>
-                  <a:ext uri="{0D108BD9-81ED-4DB2-BD59-A6C34878D82A}">
-                    <a16:rowId xmlns:a16="http://schemas.microsoft.com/office/drawing/2014/main" val="3113807952"/>
-                  </a:ext>
-                </a:extLst>
-              </a:tr>
-              <a:tr h="286986">
-                <a:tc>
-                  <a:txBody>
-                    <a:bodyPr/>
-                    <a:lstStyle/>
-                    <a:p>
-                      <a:r>
-                        <a:rPr lang="en-KE" sz="1400" dirty="0"/>
-                        <a:t>-d dir</a:t>
-                      </a:r>
-                    </a:p>
-                  </a:txBody>
-                  <a:tcPr/>
-                </a:tc>
-                <a:tc>
-                  <a:txBody>
-                    <a:bodyPr/>
-                    <a:lstStyle/>
-                    <a:p>
-                      <a:r>
-                        <a:rPr lang="en-KE" sz="1400" dirty="0"/>
-                        <a:t>Is directory exists and not a file</a:t>
-                      </a:r>
-                    </a:p>
-                  </a:txBody>
-                  <a:tcPr/>
-                </a:tc>
-                <a:extLst>
-                  <a:ext uri="{0D108BD9-81ED-4DB2-BD59-A6C34878D82A}">
-                    <a16:rowId xmlns:a16="http://schemas.microsoft.com/office/drawing/2014/main" val="3771498984"/>
-                  </a:ext>
-                </a:extLst>
-              </a:tr>
-              <a:tr h="286986">
-                <a:tc>
-                  <a:txBody>
-                    <a:bodyPr/>
-                    <a:lstStyle/>
-                    <a:p>
-                      <a:r>
-                        <a:rPr lang="en-KE" sz="1400" dirty="0"/>
-                        <a:t>-w file</a:t>
-                      </a:r>
-                    </a:p>
-                  </a:txBody>
-                  <a:tcPr/>
-                </a:tc>
-                <a:tc>
-                  <a:txBody>
-                    <a:bodyPr/>
-                    <a:lstStyle/>
-                    <a:p>
-                      <a:r>
-                        <a:rPr lang="en-US" sz="1400" dirty="0"/>
-                        <a:t>I</a:t>
-                      </a:r>
-                      <a:r>
-                        <a:rPr lang="en-KE" sz="1400" dirty="0"/>
-                        <a:t>s a writeable file</a:t>
-                      </a:r>
-                    </a:p>
-                  </a:txBody>
-                  <a:tcPr/>
-                </a:tc>
-                <a:extLst>
-                  <a:ext uri="{0D108BD9-81ED-4DB2-BD59-A6C34878D82A}">
-                    <a16:rowId xmlns:a16="http://schemas.microsoft.com/office/drawing/2014/main" val="4234327023"/>
-                  </a:ext>
-                </a:extLst>
-              </a:tr>
-              <a:tr h="286986">
-                <a:tc>
-                  <a:txBody>
-                    <a:bodyPr/>
-                    <a:lstStyle/>
-                    <a:p>
-                      <a:r>
-                        <a:rPr lang="en-KE" sz="1400" dirty="0"/>
-                        <a:t>-r file</a:t>
-                      </a:r>
-                    </a:p>
-                  </a:txBody>
-                  <a:tcPr/>
-                </a:tc>
-                <a:tc>
-                  <a:txBody>
-                    <a:bodyPr/>
-                    <a:lstStyle/>
-                    <a:p>
-                      <a:r>
-                        <a:rPr lang="en-KE" sz="1400" dirty="0"/>
-                        <a:t>Is a read-only file</a:t>
-                      </a:r>
-                    </a:p>
-                  </a:txBody>
-                  <a:tcPr/>
-                </a:tc>
-                <a:extLst>
-                  <a:ext uri="{0D108BD9-81ED-4DB2-BD59-A6C34878D82A}">
-                    <a16:rowId xmlns:a16="http://schemas.microsoft.com/office/drawing/2014/main" val="2383233232"/>
-                  </a:ext>
-                </a:extLst>
-              </a:tr>
-              <a:tr h="286986">
-                <a:tc>
-                  <a:txBody>
-                    <a:bodyPr/>
-                    <a:lstStyle/>
-                    <a:p>
-                      <a:r>
-                        <a:rPr lang="en-KE" sz="1400" dirty="0"/>
-                        <a:t>-x file</a:t>
-                      </a:r>
-                    </a:p>
-                  </a:txBody>
-                  <a:tcPr/>
-                </a:tc>
-                <a:tc>
-                  <a:txBody>
-                    <a:bodyPr/>
-                    <a:lstStyle/>
-                    <a:p>
-                      <a:r>
-                        <a:rPr lang="en-US" sz="1400" dirty="0"/>
-                        <a:t>I</a:t>
-                      </a:r>
-                      <a:r>
-                        <a:rPr lang="en-KE" sz="1400" dirty="0"/>
-                        <a:t>s an executable file</a:t>
-                      </a:r>
-                    </a:p>
-                  </a:txBody>
-                  <a:tcPr/>
-                </a:tc>
-                <a:extLst>
-                  <a:ext uri="{0D108BD9-81ED-4DB2-BD59-A6C34878D82A}">
-                    <a16:rowId xmlns:a16="http://schemas.microsoft.com/office/drawing/2014/main" val="2689601583"/>
-                  </a:ext>
-                </a:extLst>
-              </a:tr>
-              <a:tr h="286986">
-                <a:tc>
-                  <a:txBody>
-                    <a:bodyPr/>
-                    <a:lstStyle/>
-                    <a:p>
-                      <a:r>
-                        <a:rPr lang="en-KE" sz="1400" dirty="0"/>
-                        <a:t>! </a:t>
-                      </a:r>
-                      <a:r>
-                        <a:rPr lang="en-US" sz="1400" dirty="0"/>
-                        <a:t>E</a:t>
-                      </a:r>
-                      <a:r>
-                        <a:rPr lang="en-KE" sz="1400" dirty="0"/>
-                        <a:t>xpression</a:t>
-                      </a:r>
-                    </a:p>
-                  </a:txBody>
-                  <a:tcPr/>
-                </a:tc>
-                <a:tc>
-                  <a:txBody>
-                    <a:bodyPr/>
-                    <a:lstStyle/>
-                    <a:p>
-                      <a:r>
-                        <a:rPr lang="en-KE" sz="1400" dirty="0"/>
-                        <a:t>Logical NOT</a:t>
-                      </a:r>
-                    </a:p>
-                  </a:txBody>
-                  <a:tcPr/>
-                </a:tc>
-                <a:extLst>
-                  <a:ext uri="{0D108BD9-81ED-4DB2-BD59-A6C34878D82A}">
-                    <a16:rowId xmlns:a16="http://schemas.microsoft.com/office/drawing/2014/main" val="1744683632"/>
-                  </a:ext>
-                </a:extLst>
-              </a:tr>
-              <a:tr h="286986">
-                <a:tc>
-                  <a:txBody>
-                    <a:bodyPr/>
-                    <a:lstStyle/>
-                    <a:p>
-                      <a:r>
-                        <a:rPr lang="en-US" sz="1400" dirty="0"/>
-                        <a:t>e</a:t>
-                      </a:r>
-                      <a:r>
-                        <a:rPr lang="en-KE" sz="1400" dirty="0"/>
-                        <a:t>xpr1 –a expr2</a:t>
-                      </a:r>
-                    </a:p>
-                  </a:txBody>
-                  <a:tcPr/>
-                </a:tc>
-                <a:tc>
-                  <a:txBody>
-                    <a:bodyPr/>
-                    <a:lstStyle/>
-                    <a:p>
-                      <a:r>
-                        <a:rPr lang="en-KE" sz="1400" dirty="0"/>
-                        <a:t>Logical AND</a:t>
-                      </a:r>
-                    </a:p>
-                  </a:txBody>
-                  <a:tcPr/>
-                </a:tc>
-                <a:extLst>
-                  <a:ext uri="{0D108BD9-81ED-4DB2-BD59-A6C34878D82A}">
-                    <a16:rowId xmlns:a16="http://schemas.microsoft.com/office/drawing/2014/main" val="3164581874"/>
-                  </a:ext>
-                </a:extLst>
-              </a:tr>
-              <a:tr h="286986">
-                <a:tc>
-                  <a:txBody>
-                    <a:bodyPr/>
-                    <a:lstStyle/>
-                    <a:p>
-                      <a:r>
-                        <a:rPr lang="en-US" sz="1400" dirty="0"/>
-                        <a:t>e</a:t>
-                      </a:r>
-                      <a:r>
-                        <a:rPr lang="en-KE" sz="1400" dirty="0"/>
-                        <a:t>xpr1 –o expr2</a:t>
-                      </a:r>
-                    </a:p>
-                  </a:txBody>
-                  <a:tcPr/>
-                </a:tc>
-                <a:tc>
-                  <a:txBody>
-                    <a:bodyPr/>
-                    <a:lstStyle/>
-                    <a:p>
-                      <a:r>
-                        <a:rPr lang="en-KE" sz="1400" dirty="0"/>
-                        <a:t>Logical OR</a:t>
-                      </a:r>
-                    </a:p>
-                  </a:txBody>
-                  <a:tcPr/>
-                </a:tc>
-                <a:extLst>
-                  <a:ext uri="{0D108BD9-81ED-4DB2-BD59-A6C34878D82A}">
-                    <a16:rowId xmlns:a16="http://schemas.microsoft.com/office/drawing/2014/main" val="1034165085"/>
-                  </a:ext>
-                </a:extLst>
-              </a:tr>
-            </a:tbl>
-          </a:graphicData>
-        </a:graphic>
-      </p:graphicFrame>
     </p:spTree>
     <p:extLst>
       <p:ext uri="{BB962C8B-B14F-4D97-AF65-F5344CB8AC3E}">

</xml_diff>